<commit_message>
Added minutes and presentation
</commit_message>
<xml_diff>
--- a/Presentations/Group 1- Presentation 3.pptx
+++ b/Presentations/Group 1- Presentation 3.pptx
@@ -5,7 +5,7 @@
     <p:sldMasterId id="2147483665" r:id="rId1"/>
   </p:sldMasterIdLst>
   <p:notesMasterIdLst>
-    <p:notesMasterId r:id="rId14"/>
+    <p:notesMasterId r:id="rId16"/>
   </p:notesMasterIdLst>
   <p:sldIdLst>
     <p:sldId id="256" r:id="rId2"/>
@@ -19,17 +19,19 @@
     <p:sldId id="264" r:id="rId10"/>
     <p:sldId id="265" r:id="rId11"/>
     <p:sldId id="269" r:id="rId12"/>
-    <p:sldId id="270" r:id="rId13"/>
+    <p:sldId id="271" r:id="rId13"/>
+    <p:sldId id="272" r:id="rId14"/>
+    <p:sldId id="270" r:id="rId15"/>
   </p:sldIdLst>
   <p:sldSz cx="9144000" cy="5143500" type="screen16x9"/>
   <p:notesSz cx="6858000" cy="9144000"/>
   <p:embeddedFontLst>
     <p:embeddedFont>
       <p:font typeface="Century Gothic" panose="020B0502020202020204" pitchFamily="34" charset="0"/>
-      <p:regular r:id="rId15"/>
-      <p:bold r:id="rId16"/>
-      <p:italic r:id="rId17"/>
-      <p:boldItalic r:id="rId18"/>
+      <p:regular r:id="rId17"/>
+      <p:bold r:id="rId18"/>
+      <p:italic r:id="rId19"/>
+      <p:boldItalic r:id="rId20"/>
     </p:embeddedFont>
   </p:embeddedFontLst>
   <p:defaultTextStyle>
@@ -234,6 +236,11 @@
       </a:defRPr>
     </a:lvl9pPr>
   </p:defaultTextStyle>
+  <p:extLst>
+    <p:ext uri="{EFAFB233-063F-42B5-8137-9DF3F51BA10A}">
+      <p15:sldGuideLst xmlns:p15="http://schemas.microsoft.com/office/powerpoint/2012/main"/>
+    </p:ext>
+  </p:extLst>
 </p:presentation>
 </file>
 
@@ -23911,7 +23918,7 @@
               <a:buNone/>
             </a:pPr>
             <a:r>
-              <a:rPr lang="en" sz="3600" b="0" i="0" u="none" strike="noStrike" cap="none">
+              <a:rPr lang="en" sz="3600" b="0" i="0" u="none" strike="noStrike" cap="none" dirty="0">
                 <a:solidFill>
                   <a:srgbClr val="68370E"/>
                 </a:solidFill>
@@ -23920,10 +23927,10 @@
                 <a:cs typeface="Century Gothic"/>
                 <a:sym typeface="Century Gothic"/>
               </a:rPr>
-              <a:t>Group 1: Presentation 2</a:t>
+              <a:t>Group 1: Presentation 3</a:t>
             </a:r>
             <a:br>
-              <a:rPr lang="en" sz="3600" b="0" i="0" u="none" strike="noStrike" cap="none">
+              <a:rPr lang="en" sz="3600" b="0" i="0" u="none" strike="noStrike" cap="none" dirty="0">
                 <a:solidFill>
                   <a:srgbClr val="68370E"/>
                 </a:solidFill>
@@ -23934,7 +23941,7 @@
               </a:rPr>
             </a:br>
             <a:r>
-              <a:rPr lang="en" sz="2000" b="0" i="0" u="none" strike="noStrike" cap="none">
+              <a:rPr lang="en" sz="2000" b="0" i="0" u="none" strike="noStrike" cap="none" dirty="0">
                 <a:solidFill>
                   <a:srgbClr val="68370E"/>
                 </a:solidFill>
@@ -23946,7 +23953,7 @@
               <a:t>IMDCGD111-15YRD</a:t>
             </a:r>
             <a:br>
-              <a:rPr lang="en" sz="2400" b="0" i="0" u="none" strike="noStrike" cap="none">
+              <a:rPr lang="en" sz="2400" b="0" i="0" u="none" strike="noStrike" cap="none" dirty="0">
                 <a:solidFill>
                   <a:srgbClr val="68370E"/>
                 </a:solidFill>
@@ -23957,7 +23964,7 @@
               </a:rPr>
             </a:br>
             <a:r>
-              <a:rPr lang="en" sz="2400" b="0" i="0" u="none" strike="noStrike" cap="none">
+              <a:rPr lang="en" sz="2400" b="0" i="0" u="none" strike="noStrike" cap="none" dirty="0">
                 <a:solidFill>
                   <a:srgbClr val="68370E"/>
                 </a:solidFill>
@@ -24637,6 +24644,569 @@
   <p:cSld>
     <p:spTree>
       <p:nvGrpSpPr>
+        <p:cNvPr id="1" name=""/>
+        <p:cNvGrpSpPr/>
+        <p:nvPr/>
+      </p:nvGrpSpPr>
+      <p:grpSpPr>
+        <a:xfrm>
+          <a:off x="0" y="0"/>
+          <a:ext cx="0" cy="0"/>
+          <a:chOff x="0" y="0"/>
+          <a:chExt cx="0" cy="0"/>
+        </a:xfrm>
+      </p:grpSpPr>
+      <p:sp>
+        <p:nvSpPr>
+          <p:cNvPr id="2" name="Title 1"/>
+          <p:cNvSpPr>
+            <a:spLocks noGrp="1"/>
+          </p:cNvSpPr>
+          <p:nvPr>
+            <p:ph type="title"/>
+          </p:nvPr>
+        </p:nvSpPr>
+        <p:spPr>
+          <a:xfrm>
+            <a:off x="333864" y="290604"/>
+            <a:ext cx="6400799" cy="1130400"/>
+          </a:xfrm>
+        </p:spPr>
+        <p:txBody>
+          <a:bodyPr/>
+          <a:lstStyle/>
+          <a:p>
+            <a:r>
+              <a:rPr lang="en-GB" sz="4000" dirty="0"/>
+              <a:t>Final Delivery</a:t>
+            </a:r>
+          </a:p>
+        </p:txBody>
+      </p:sp>
+      <p:sp>
+        <p:nvSpPr>
+          <p:cNvPr id="6" name="Shape 201"/>
+          <p:cNvSpPr txBox="1">
+            <a:spLocks noGrp="1"/>
+          </p:cNvSpPr>
+          <p:nvPr>
+            <p:ph type="body" idx="1"/>
+          </p:nvPr>
+        </p:nvSpPr>
+        <p:spPr>
+          <a:xfrm>
+            <a:off x="333863" y="1344706"/>
+            <a:ext cx="6400799" cy="3469341"/>
+          </a:xfrm>
+          <a:prstGeom prst="rect">
+            <a:avLst/>
+          </a:prstGeom>
+          <a:noFill/>
+          <a:ln>
+            <a:noFill/>
+          </a:ln>
+        </p:spPr>
+        <p:txBody>
+          <a:bodyPr lIns="68575" tIns="68575" rIns="68575" bIns="68575" anchor="ctr" anchorCtr="0">
+            <a:noAutofit/>
+          </a:bodyPr>
+          <a:lstStyle/>
+          <a:p>
+            <a:pPr marL="0" marR="0" lvl="0" indent="0" algn="l" rtl="0">
+              <a:lnSpc>
+                <a:spcPct val="100000"/>
+              </a:lnSpc>
+              <a:spcBef>
+                <a:spcPts val="0"/>
+              </a:spcBef>
+              <a:spcAft>
+                <a:spcPts val="0"/>
+              </a:spcAft>
+              <a:buClr>
+                <a:schemeClr val="lt1"/>
+              </a:buClr>
+              <a:buSzPct val="25000"/>
+              <a:buFont typeface="Noto Sans Symbols"/>
+              <a:buNone/>
+            </a:pPr>
+            <a:endParaRPr sz="2400" b="0" i="0" u="none" strike="noStrike" cap="none" dirty="0">
+              <a:solidFill>
+                <a:srgbClr val="68370E"/>
+              </a:solidFill>
+              <a:latin typeface="Century Gothic"/>
+              <a:ea typeface="Century Gothic"/>
+              <a:cs typeface="Century Gothic"/>
+              <a:sym typeface="Century Gothic"/>
+            </a:endParaRPr>
+          </a:p>
+          <a:p>
+            <a:pPr marL="457200" marR="0" lvl="0" indent="-381000" algn="l" rtl="0">
+              <a:lnSpc>
+                <a:spcPct val="100000"/>
+              </a:lnSpc>
+              <a:spcBef>
+                <a:spcPts val="500"/>
+              </a:spcBef>
+              <a:spcAft>
+                <a:spcPts val="0"/>
+              </a:spcAft>
+              <a:buClr>
+                <a:schemeClr val="lt1"/>
+              </a:buClr>
+              <a:buSzPct val="100000"/>
+              <a:buFont typeface="Noto Sans Symbols"/>
+              <a:buChar char="▶"/>
+            </a:pPr>
+            <a:r>
+              <a:rPr lang="en-GB" sz="2400" dirty="0"/>
+              <a:t>Refined </a:t>
+            </a:r>
+            <a:r>
+              <a:rPr lang="en" sz="2400" dirty="0"/>
+              <a:t>Menu </a:t>
+            </a:r>
+            <a:r>
+              <a:rPr lang="en-GB" sz="2400" dirty="0"/>
+              <a:t>&amp; Tutorial Screen.</a:t>
+            </a:r>
+            <a:endParaRPr lang="en" sz="2400" dirty="0"/>
+          </a:p>
+          <a:p>
+            <a:pPr marL="457200" marR="0" lvl="0" indent="-381000" algn="l" rtl="0">
+              <a:lnSpc>
+                <a:spcPct val="100000"/>
+              </a:lnSpc>
+              <a:spcBef>
+                <a:spcPts val="500"/>
+              </a:spcBef>
+              <a:spcAft>
+                <a:spcPts val="0"/>
+              </a:spcAft>
+              <a:buClr>
+                <a:schemeClr val="lt1"/>
+              </a:buClr>
+              <a:buSzPct val="100000"/>
+              <a:buFont typeface="Noto Sans Symbols"/>
+              <a:buChar char="▶"/>
+            </a:pPr>
+            <a:endParaRPr sz="2400" b="0" i="0" u="none" strike="noStrike" cap="none" dirty="0">
+              <a:solidFill>
+                <a:srgbClr val="68370E"/>
+              </a:solidFill>
+              <a:latin typeface="Century Gothic"/>
+              <a:ea typeface="Century Gothic"/>
+              <a:cs typeface="Century Gothic"/>
+              <a:sym typeface="Century Gothic"/>
+            </a:endParaRPr>
+          </a:p>
+          <a:p>
+            <a:pPr marL="457200" marR="0" lvl="0" indent="-381000" algn="l" rtl="0">
+              <a:lnSpc>
+                <a:spcPct val="100000"/>
+              </a:lnSpc>
+              <a:spcBef>
+                <a:spcPts val="500"/>
+              </a:spcBef>
+              <a:spcAft>
+                <a:spcPts val="0"/>
+              </a:spcAft>
+              <a:buClr>
+                <a:schemeClr val="lt1"/>
+              </a:buClr>
+              <a:buSzPct val="100000"/>
+              <a:buFont typeface="Noto Sans Symbols"/>
+              <a:buChar char="▶"/>
+            </a:pPr>
+            <a:r>
+              <a:rPr lang="en-GB" sz="2400" b="0" i="0" u="none" strike="noStrike" cap="none" dirty="0">
+                <a:solidFill>
+                  <a:srgbClr val="68370E"/>
+                </a:solidFill>
+                <a:latin typeface="Century Gothic"/>
+                <a:ea typeface="Century Gothic"/>
+                <a:cs typeface="Century Gothic"/>
+                <a:sym typeface="Century Gothic"/>
+              </a:rPr>
+              <a:t>Refined Recoil &amp; Knockback to feel natural.</a:t>
+            </a:r>
+          </a:p>
+          <a:p>
+            <a:pPr marL="457200" marR="0" lvl="0" indent="-381000" algn="l" rtl="0">
+              <a:lnSpc>
+                <a:spcPct val="100000"/>
+              </a:lnSpc>
+              <a:spcBef>
+                <a:spcPts val="500"/>
+              </a:spcBef>
+              <a:spcAft>
+                <a:spcPts val="0"/>
+              </a:spcAft>
+              <a:buClr>
+                <a:schemeClr val="lt1"/>
+              </a:buClr>
+              <a:buSzPct val="100000"/>
+              <a:buFont typeface="Noto Sans Symbols"/>
+              <a:buChar char="▶"/>
+            </a:pPr>
+            <a:endParaRPr lang="en-GB" sz="2400" b="0" i="0" u="none" strike="noStrike" cap="none" dirty="0">
+              <a:solidFill>
+                <a:srgbClr val="68370E"/>
+              </a:solidFill>
+              <a:latin typeface="Century Gothic"/>
+              <a:ea typeface="Century Gothic"/>
+              <a:cs typeface="Century Gothic"/>
+              <a:sym typeface="Century Gothic"/>
+            </a:endParaRPr>
+          </a:p>
+          <a:p>
+            <a:pPr marL="457200" marR="0" lvl="0" indent="-381000" algn="l" rtl="0">
+              <a:lnSpc>
+                <a:spcPct val="100000"/>
+              </a:lnSpc>
+              <a:spcBef>
+                <a:spcPts val="500"/>
+              </a:spcBef>
+              <a:spcAft>
+                <a:spcPts val="0"/>
+              </a:spcAft>
+              <a:buClr>
+                <a:schemeClr val="lt1"/>
+              </a:buClr>
+              <a:buSzPct val="100000"/>
+              <a:buFont typeface="Noto Sans Symbols"/>
+              <a:buChar char="▶"/>
+            </a:pPr>
+            <a:r>
+              <a:rPr lang="en-GB" sz="2400" dirty="0"/>
+              <a:t>Add an Additional 2 players &amp; play test 4 player arena.</a:t>
+            </a:r>
+            <a:endParaRPr lang="en" sz="2400" b="0" i="0" u="none" strike="noStrike" cap="none" dirty="0">
+              <a:solidFill>
+                <a:srgbClr val="68370E"/>
+              </a:solidFill>
+              <a:latin typeface="Century Gothic"/>
+              <a:ea typeface="Century Gothic"/>
+              <a:cs typeface="Century Gothic"/>
+              <a:sym typeface="Century Gothic"/>
+            </a:endParaRPr>
+          </a:p>
+          <a:p>
+            <a:pPr marL="457200" marR="0" lvl="0" indent="-381000" algn="l" rtl="0">
+              <a:lnSpc>
+                <a:spcPct val="100000"/>
+              </a:lnSpc>
+              <a:spcBef>
+                <a:spcPts val="500"/>
+              </a:spcBef>
+              <a:spcAft>
+                <a:spcPts val="0"/>
+              </a:spcAft>
+              <a:buClr>
+                <a:schemeClr val="lt1"/>
+              </a:buClr>
+              <a:buSzPct val="100000"/>
+              <a:buFont typeface="Noto Sans Symbols"/>
+              <a:buChar char="▶"/>
+            </a:pPr>
+            <a:endParaRPr lang="en" sz="2400" b="0" i="0" u="none" strike="noStrike" cap="none" dirty="0">
+              <a:solidFill>
+                <a:srgbClr val="68370E"/>
+              </a:solidFill>
+              <a:latin typeface="Century Gothic"/>
+              <a:ea typeface="Century Gothic"/>
+              <a:cs typeface="Century Gothic"/>
+              <a:sym typeface="Century Gothic"/>
+            </a:endParaRPr>
+          </a:p>
+        </p:txBody>
+      </p:sp>
+    </p:spTree>
+    <p:extLst>
+      <p:ext uri="{BB962C8B-B14F-4D97-AF65-F5344CB8AC3E}">
+        <p14:creationId xmlns:p14="http://schemas.microsoft.com/office/powerpoint/2010/main" val="1534058829"/>
+      </p:ext>
+    </p:extLst>
+  </p:cSld>
+  <p:clrMapOvr>
+    <a:masterClrMapping/>
+  </p:clrMapOvr>
+</p:sld>
+</file>
+
+<file path=ppt/slides/slide13.xml><?xml version="1.0" encoding="utf-8"?>
+<p:sld xmlns:a="http://schemas.openxmlformats.org/drawingml/2006/main" xmlns:r="http://schemas.openxmlformats.org/officeDocument/2006/relationships" xmlns:p="http://schemas.openxmlformats.org/presentationml/2006/main">
+  <p:cSld>
+    <p:spTree>
+      <p:nvGrpSpPr>
+        <p:cNvPr id="1" name=""/>
+        <p:cNvGrpSpPr/>
+        <p:nvPr/>
+      </p:nvGrpSpPr>
+      <p:grpSpPr>
+        <a:xfrm>
+          <a:off x="0" y="0"/>
+          <a:ext cx="0" cy="0"/>
+          <a:chOff x="0" y="0"/>
+          <a:chExt cx="0" cy="0"/>
+        </a:xfrm>
+      </p:grpSpPr>
+      <p:sp>
+        <p:nvSpPr>
+          <p:cNvPr id="2" name="Title 1"/>
+          <p:cNvSpPr>
+            <a:spLocks noGrp="1"/>
+          </p:cNvSpPr>
+          <p:nvPr>
+            <p:ph type="title"/>
+          </p:nvPr>
+        </p:nvSpPr>
+        <p:spPr>
+          <a:xfrm>
+            <a:off x="432475" y="326463"/>
+            <a:ext cx="6400799" cy="1130400"/>
+          </a:xfrm>
+        </p:spPr>
+        <p:txBody>
+          <a:bodyPr/>
+          <a:lstStyle/>
+          <a:p>
+            <a:r>
+              <a:rPr lang="en-GB" sz="3200" dirty="0"/>
+              <a:t>Meeting the Brief </a:t>
+            </a:r>
+          </a:p>
+        </p:txBody>
+      </p:sp>
+      <p:sp>
+        <p:nvSpPr>
+          <p:cNvPr id="5" name="Shape 201"/>
+          <p:cNvSpPr txBox="1">
+            <a:spLocks noGrp="1"/>
+          </p:cNvSpPr>
+          <p:nvPr>
+            <p:ph type="body" idx="1"/>
+          </p:nvPr>
+        </p:nvSpPr>
+        <p:spPr>
+          <a:xfrm>
+            <a:off x="432475" y="1303244"/>
+            <a:ext cx="6400799" cy="3474943"/>
+          </a:xfrm>
+          <a:prstGeom prst="rect">
+            <a:avLst/>
+          </a:prstGeom>
+          <a:noFill/>
+          <a:ln>
+            <a:noFill/>
+          </a:ln>
+        </p:spPr>
+        <p:txBody>
+          <a:bodyPr lIns="68575" tIns="68575" rIns="68575" bIns="68575" anchor="ctr" anchorCtr="0">
+            <a:noAutofit/>
+          </a:bodyPr>
+          <a:lstStyle/>
+          <a:p>
+            <a:pPr marL="0" marR="0" lvl="0" indent="0" algn="l" rtl="0">
+              <a:lnSpc>
+                <a:spcPct val="100000"/>
+              </a:lnSpc>
+              <a:spcBef>
+                <a:spcPts val="0"/>
+              </a:spcBef>
+              <a:spcAft>
+                <a:spcPts val="0"/>
+              </a:spcAft>
+              <a:buClr>
+                <a:schemeClr val="lt1"/>
+              </a:buClr>
+              <a:buSzPct val="25000"/>
+              <a:buFont typeface="Noto Sans Symbols"/>
+              <a:buNone/>
+            </a:pPr>
+            <a:endParaRPr sz="2400" b="0" i="0" u="none" strike="noStrike" cap="none" dirty="0">
+              <a:solidFill>
+                <a:srgbClr val="68370E"/>
+              </a:solidFill>
+              <a:latin typeface="Century Gothic"/>
+              <a:ea typeface="Century Gothic"/>
+              <a:cs typeface="Century Gothic"/>
+              <a:sym typeface="Century Gothic"/>
+            </a:endParaRPr>
+          </a:p>
+          <a:p>
+            <a:pPr marL="457200" marR="0" lvl="0" indent="-381000" algn="l" rtl="0">
+              <a:spcBef>
+                <a:spcPts val="500"/>
+              </a:spcBef>
+              <a:spcAft>
+                <a:spcPts val="0"/>
+              </a:spcAft>
+              <a:buClr>
+                <a:schemeClr val="lt1"/>
+              </a:buClr>
+              <a:buSzPct val="100000"/>
+              <a:buFont typeface="Noto Sans Symbols"/>
+              <a:buChar char="▶"/>
+            </a:pPr>
+            <a:r>
+              <a:rPr lang="en-GB" sz="1800" dirty="0"/>
+              <a:t>Physics driven by </a:t>
+            </a:r>
+            <a:r>
+              <a:rPr lang="en-GB" sz="1800" b="0" i="0" u="none" strike="noStrike" cap="none" dirty="0">
+                <a:solidFill>
+                  <a:srgbClr val="68370E"/>
+                </a:solidFill>
+                <a:latin typeface="Century Gothic"/>
+                <a:ea typeface="Century Gothic"/>
+                <a:cs typeface="Century Gothic"/>
+                <a:sym typeface="Century Gothic"/>
+              </a:rPr>
+              <a:t>Knockback &amp; Recoil. </a:t>
+            </a:r>
+          </a:p>
+          <a:p>
+            <a:pPr marL="457200" marR="0" lvl="0" indent="-381000" algn="l" rtl="0">
+              <a:spcBef>
+                <a:spcPts val="500"/>
+              </a:spcBef>
+              <a:spcAft>
+                <a:spcPts val="0"/>
+              </a:spcAft>
+              <a:buClr>
+                <a:schemeClr val="lt1"/>
+              </a:buClr>
+              <a:buSzPct val="100000"/>
+              <a:buFont typeface="Noto Sans Symbols"/>
+              <a:buChar char="▶"/>
+            </a:pPr>
+            <a:endParaRPr sz="1800" b="0" i="0" u="none" strike="noStrike" cap="none" dirty="0">
+              <a:solidFill>
+                <a:srgbClr val="68370E"/>
+              </a:solidFill>
+              <a:latin typeface="Century Gothic"/>
+              <a:ea typeface="Century Gothic"/>
+              <a:cs typeface="Century Gothic"/>
+              <a:sym typeface="Century Gothic"/>
+            </a:endParaRPr>
+          </a:p>
+          <a:p>
+            <a:pPr marL="457200" marR="0" lvl="0" indent="-381000" algn="l" rtl="0">
+              <a:spcBef>
+                <a:spcPts val="500"/>
+              </a:spcBef>
+              <a:spcAft>
+                <a:spcPts val="0"/>
+              </a:spcAft>
+              <a:buClr>
+                <a:schemeClr val="lt1"/>
+              </a:buClr>
+              <a:buSzPct val="100000"/>
+              <a:buFont typeface="Noto Sans Symbols"/>
+              <a:buChar char="▶"/>
+            </a:pPr>
+            <a:r>
+              <a:rPr lang="en-GB" sz="1800" b="0" i="0" u="none" strike="noStrike" cap="none" dirty="0">
+                <a:solidFill>
+                  <a:srgbClr val="68370E"/>
+                </a:solidFill>
+                <a:latin typeface="Century Gothic"/>
+                <a:ea typeface="Century Gothic"/>
+                <a:cs typeface="Century Gothic"/>
+                <a:sym typeface="Century Gothic"/>
+              </a:rPr>
+              <a:t>The arena uses symmetry to enable balance between the players.</a:t>
+            </a:r>
+          </a:p>
+          <a:p>
+            <a:pPr marL="457200" marR="0" lvl="0" indent="-381000" algn="l" rtl="0">
+              <a:spcBef>
+                <a:spcPts val="500"/>
+              </a:spcBef>
+              <a:spcAft>
+                <a:spcPts val="0"/>
+              </a:spcAft>
+              <a:buClr>
+                <a:schemeClr val="lt1"/>
+              </a:buClr>
+              <a:buSzPct val="100000"/>
+              <a:buFont typeface="Noto Sans Symbols"/>
+              <a:buChar char="▶"/>
+            </a:pPr>
+            <a:endParaRPr lang="en-GB" sz="1800" b="0" i="0" u="none" strike="noStrike" cap="none" dirty="0">
+              <a:solidFill>
+                <a:srgbClr val="68370E"/>
+              </a:solidFill>
+              <a:latin typeface="Century Gothic"/>
+              <a:ea typeface="Century Gothic"/>
+              <a:cs typeface="Century Gothic"/>
+              <a:sym typeface="Century Gothic"/>
+            </a:endParaRPr>
+          </a:p>
+          <a:p>
+            <a:pPr marL="457200" marR="0" lvl="0" indent="-381000" algn="l" rtl="0">
+              <a:spcBef>
+                <a:spcPts val="500"/>
+              </a:spcBef>
+              <a:spcAft>
+                <a:spcPts val="0"/>
+              </a:spcAft>
+              <a:buClr>
+                <a:schemeClr val="lt1"/>
+              </a:buClr>
+              <a:buSzPct val="100000"/>
+              <a:buFont typeface="Noto Sans Symbols"/>
+              <a:buChar char="▶"/>
+            </a:pPr>
+            <a:r>
+              <a:rPr lang="en-GB" sz="1800" dirty="0"/>
+              <a:t>The game’s originality comes from the theme; as well as knockback physics.</a:t>
+            </a:r>
+          </a:p>
+          <a:p>
+            <a:pPr marL="76200" marR="0" lvl="0" indent="0" algn="l" rtl="0">
+              <a:spcBef>
+                <a:spcPts val="500"/>
+              </a:spcBef>
+              <a:spcAft>
+                <a:spcPts val="0"/>
+              </a:spcAft>
+              <a:buClr>
+                <a:schemeClr val="lt1"/>
+              </a:buClr>
+              <a:buSzPct val="100000"/>
+              <a:buNone/>
+            </a:pPr>
+            <a:endParaRPr lang="en-GB" sz="1800" b="0" i="0" u="none" strike="noStrike" cap="none" dirty="0">
+              <a:solidFill>
+                <a:srgbClr val="68370E"/>
+              </a:solidFill>
+              <a:latin typeface="Century Gothic"/>
+              <a:ea typeface="Century Gothic"/>
+              <a:cs typeface="Century Gothic"/>
+              <a:sym typeface="Century Gothic"/>
+            </a:endParaRPr>
+          </a:p>
+        </p:txBody>
+      </p:sp>
+    </p:spTree>
+    <p:extLst>
+      <p:ext uri="{BB962C8B-B14F-4D97-AF65-F5344CB8AC3E}">
+        <p14:creationId xmlns:p14="http://schemas.microsoft.com/office/powerpoint/2010/main" val="1014187244"/>
+      </p:ext>
+    </p:extLst>
+  </p:cSld>
+  <p:clrMapOvr>
+    <a:masterClrMapping/>
+  </p:clrMapOvr>
+</p:sld>
+</file>
+
+<file path=ppt/slides/slide14.xml><?xml version="1.0" encoding="utf-8"?>
+<p:sld xmlns:a="http://schemas.openxmlformats.org/drawingml/2006/main" xmlns:r="http://schemas.openxmlformats.org/officeDocument/2006/relationships" xmlns:p="http://schemas.openxmlformats.org/presentationml/2006/main">
+  <p:cSld>
+    <p:spTree>
+      <p:nvGrpSpPr>
         <p:cNvPr id="1" name="Shape 247"/>
         <p:cNvGrpSpPr/>
         <p:nvPr/>
@@ -24796,87 +25366,6 @@
           </a:p>
         </p:txBody>
       </p:sp>
-      <p:sp>
-        <p:nvSpPr>
-          <p:cNvPr id="146" name="Shape 146"/>
-          <p:cNvSpPr txBox="1">
-            <a:spLocks noGrp="1"/>
-          </p:cNvSpPr>
-          <p:nvPr>
-            <p:ph type="body" idx="1"/>
-          </p:nvPr>
-        </p:nvSpPr>
-        <p:spPr>
-          <a:xfrm>
-            <a:off x="578150" y="2728400"/>
-            <a:ext cx="8389800" cy="1240500"/>
-          </a:xfrm>
-          <a:prstGeom prst="rect">
-            <a:avLst/>
-          </a:prstGeom>
-          <a:noFill/>
-          <a:ln>
-            <a:noFill/>
-          </a:ln>
-        </p:spPr>
-        <p:txBody>
-          <a:bodyPr lIns="68575" tIns="68575" rIns="68575" bIns="68575" anchor="ctr" anchorCtr="0">
-            <a:noAutofit/>
-          </a:bodyPr>
-          <a:lstStyle/>
-          <a:p>
-            <a:pPr marL="215900" marR="0" lvl="0" indent="-139700" algn="l" rtl="0">
-              <a:lnSpc>
-                <a:spcPct val="100000"/>
-              </a:lnSpc>
-              <a:spcBef>
-                <a:spcPts val="0"/>
-              </a:spcBef>
-              <a:spcAft>
-                <a:spcPts val="0"/>
-              </a:spcAft>
-              <a:buClr>
-                <a:schemeClr val="lt1"/>
-              </a:buClr>
-              <a:buSzPct val="25000"/>
-              <a:buFont typeface="Noto Sans Symbols"/>
-              <a:buNone/>
-            </a:pPr>
-            <a:endParaRPr sz="2000" b="0" i="0" u="none" strike="noStrike" cap="none">
-              <a:solidFill>
-                <a:srgbClr val="68370E"/>
-              </a:solidFill>
-              <a:latin typeface="Century Gothic"/>
-              <a:ea typeface="Century Gothic"/>
-              <a:cs typeface="Century Gothic"/>
-              <a:sym typeface="Century Gothic"/>
-            </a:endParaRPr>
-          </a:p>
-          <a:p>
-            <a:pPr marL="215900" marR="0" lvl="0" indent="-139700" algn="l" rtl="0">
-              <a:lnSpc>
-                <a:spcPct val="100000"/>
-              </a:lnSpc>
-              <a:spcBef>
-                <a:spcPts val="500"/>
-              </a:spcBef>
-              <a:spcAft>
-                <a:spcPts val="0"/>
-              </a:spcAft>
-              <a:buClr>
-                <a:schemeClr val="lt1"/>
-              </a:buClr>
-              <a:buSzPct val="80000"/>
-              <a:buFont typeface="Noto Sans Symbols"/>
-              <a:buChar char="➢"/>
-            </a:pPr>
-            <a:r>
-              <a:rPr lang="en" sz="2000"/>
-              <a:t>Arena style base capture game</a:t>
-            </a:r>
-          </a:p>
-        </p:txBody>
-      </p:sp>
       <p:pic>
         <p:nvPicPr>
           <p:cNvPr id="147" name="Shape 147"/>
@@ -24904,6 +25393,296 @@
           </a:ln>
         </p:spPr>
       </p:pic>
+      <p:sp>
+        <p:nvSpPr>
+          <p:cNvPr id="5" name="Shape 155"/>
+          <p:cNvSpPr txBox="1">
+            <a:spLocks/>
+          </p:cNvSpPr>
+          <p:nvPr/>
+        </p:nvSpPr>
+        <p:spPr>
+          <a:xfrm>
+            <a:off x="606749" y="3170109"/>
+            <a:ext cx="7930500" cy="1349400"/>
+          </a:xfrm>
+          <a:prstGeom prst="rect">
+            <a:avLst/>
+          </a:prstGeom>
+          <a:noFill/>
+          <a:ln>
+            <a:noFill/>
+          </a:ln>
+        </p:spPr>
+        <p:txBody>
+          <a:bodyPr lIns="68575" tIns="68575" rIns="68575" bIns="68575" anchor="ctr" anchorCtr="0">
+            <a:noAutofit/>
+          </a:bodyPr>
+          <a:lstStyle>
+            <a:defPPr marR="0" lvl="0" algn="l" rtl="0">
+              <a:lnSpc>
+                <a:spcPct val="100000"/>
+              </a:lnSpc>
+              <a:spcBef>
+                <a:spcPts val="0"/>
+              </a:spcBef>
+              <a:spcAft>
+                <a:spcPts val="0"/>
+              </a:spcAft>
+            </a:defPPr>
+            <a:lvl1pPr marL="215900" marR="0" lvl="0" indent="-63500" algn="l" rtl="0">
+              <a:lnSpc>
+                <a:spcPct val="100000"/>
+              </a:lnSpc>
+              <a:spcBef>
+                <a:spcPts val="300"/>
+              </a:spcBef>
+              <a:spcAft>
+                <a:spcPts val="500"/>
+              </a:spcAft>
+              <a:buClr>
+                <a:schemeClr val="lt1"/>
+              </a:buClr>
+              <a:buSzPct val="80000"/>
+              <a:buFont typeface="Noto Sans Symbols"/>
+              <a:buChar char="▶"/>
+              <a:defRPr sz="1500" b="0" i="0" u="none" strike="noStrike" cap="none">
+                <a:solidFill>
+                  <a:srgbClr val="68370E"/>
+                </a:solidFill>
+                <a:latin typeface="Century Gothic"/>
+                <a:ea typeface="Century Gothic"/>
+                <a:cs typeface="Century Gothic"/>
+                <a:sym typeface="Century Gothic"/>
+              </a:defRPr>
+            </a:lvl1pPr>
+            <a:lvl2pPr marL="558800" marR="0" lvl="1" indent="-82550" algn="l" rtl="0">
+              <a:lnSpc>
+                <a:spcPct val="100000"/>
+              </a:lnSpc>
+              <a:spcBef>
+                <a:spcPts val="300"/>
+              </a:spcBef>
+              <a:spcAft>
+                <a:spcPts val="500"/>
+              </a:spcAft>
+              <a:buClr>
+                <a:schemeClr val="lt1"/>
+              </a:buClr>
+              <a:buSzPct val="78571"/>
+              <a:buFont typeface="Noto Sans Symbols"/>
+              <a:buChar char="▶"/>
+              <a:defRPr sz="1400" b="0" i="0" u="none" strike="noStrike" cap="none">
+                <a:solidFill>
+                  <a:srgbClr val="68370E"/>
+                </a:solidFill>
+                <a:latin typeface="Century Gothic"/>
+                <a:ea typeface="Century Gothic"/>
+                <a:cs typeface="Century Gothic"/>
+                <a:sym typeface="Century Gothic"/>
+              </a:defRPr>
+            </a:lvl2pPr>
+            <a:lvl3pPr marL="901700" marR="0" lvl="2" indent="-88900" algn="l" rtl="0">
+              <a:lnSpc>
+                <a:spcPct val="100000"/>
+              </a:lnSpc>
+              <a:spcBef>
+                <a:spcPts val="200"/>
+              </a:spcBef>
+              <a:spcAft>
+                <a:spcPts val="500"/>
+              </a:spcAft>
+              <a:buClr>
+                <a:schemeClr val="lt1"/>
+              </a:buClr>
+              <a:buSzPct val="83333"/>
+              <a:buFont typeface="Noto Sans Symbols"/>
+              <a:buChar char="▶"/>
+              <a:defRPr sz="1200" b="0" i="0" u="none" strike="noStrike" cap="none">
+                <a:solidFill>
+                  <a:srgbClr val="68370E"/>
+                </a:solidFill>
+                <a:latin typeface="Century Gothic"/>
+                <a:ea typeface="Century Gothic"/>
+                <a:cs typeface="Century Gothic"/>
+                <a:sym typeface="Century Gothic"/>
+              </a:defRPr>
+            </a:lvl3pPr>
+            <a:lvl4pPr marL="1155700" marR="0" lvl="3" indent="-25400" algn="l" rtl="0">
+              <a:lnSpc>
+                <a:spcPct val="100000"/>
+              </a:lnSpc>
+              <a:spcBef>
+                <a:spcPts val="200"/>
+              </a:spcBef>
+              <a:spcAft>
+                <a:spcPts val="500"/>
+              </a:spcAft>
+              <a:buClr>
+                <a:schemeClr val="lt1"/>
+              </a:buClr>
+              <a:buSzPct val="72727"/>
+              <a:buFont typeface="Noto Sans Symbols"/>
+              <a:buChar char="▶"/>
+              <a:defRPr sz="1100" b="0" i="0" u="none" strike="noStrike" cap="none">
+                <a:solidFill>
+                  <a:srgbClr val="68370E"/>
+                </a:solidFill>
+                <a:latin typeface="Century Gothic"/>
+                <a:ea typeface="Century Gothic"/>
+                <a:cs typeface="Century Gothic"/>
+                <a:sym typeface="Century Gothic"/>
+              </a:defRPr>
+            </a:lvl4pPr>
+            <a:lvl5pPr marL="1587500" marR="0" lvl="4" indent="-114300" algn="l" rtl="0">
+              <a:lnSpc>
+                <a:spcPct val="100000"/>
+              </a:lnSpc>
+              <a:spcBef>
+                <a:spcPts val="200"/>
+              </a:spcBef>
+              <a:spcAft>
+                <a:spcPts val="500"/>
+              </a:spcAft>
+              <a:buClr>
+                <a:schemeClr val="lt1"/>
+              </a:buClr>
+              <a:buSzPct val="72727"/>
+              <a:buFont typeface="Noto Sans Symbols"/>
+              <a:buChar char="▶"/>
+              <a:defRPr sz="1100" b="0" i="0" u="none" strike="noStrike" cap="none">
+                <a:solidFill>
+                  <a:srgbClr val="68370E"/>
+                </a:solidFill>
+                <a:latin typeface="Century Gothic"/>
+                <a:ea typeface="Century Gothic"/>
+                <a:cs typeface="Century Gothic"/>
+                <a:sym typeface="Century Gothic"/>
+              </a:defRPr>
+            </a:lvl5pPr>
+            <a:lvl6pPr marL="1892300" marR="0" lvl="5" indent="-76200" algn="l" rtl="0">
+              <a:lnSpc>
+                <a:spcPct val="100000"/>
+              </a:lnSpc>
+              <a:spcBef>
+                <a:spcPts val="200"/>
+              </a:spcBef>
+              <a:spcAft>
+                <a:spcPts val="500"/>
+              </a:spcAft>
+              <a:buClr>
+                <a:schemeClr val="lt1"/>
+              </a:buClr>
+              <a:buSzPct val="72727"/>
+              <a:buFont typeface="Noto Sans Symbols"/>
+              <a:buChar char="▶"/>
+              <a:defRPr sz="1100" b="0" i="0" u="none" strike="noStrike" cap="none">
+                <a:solidFill>
+                  <a:srgbClr val="68370E"/>
+                </a:solidFill>
+                <a:latin typeface="Century Gothic"/>
+                <a:ea typeface="Century Gothic"/>
+                <a:cs typeface="Century Gothic"/>
+                <a:sym typeface="Century Gothic"/>
+              </a:defRPr>
+            </a:lvl6pPr>
+            <a:lvl7pPr marL="2235200" marR="0" lvl="6" indent="-76200" algn="l" rtl="0">
+              <a:lnSpc>
+                <a:spcPct val="100000"/>
+              </a:lnSpc>
+              <a:spcBef>
+                <a:spcPts val="200"/>
+              </a:spcBef>
+              <a:spcAft>
+                <a:spcPts val="500"/>
+              </a:spcAft>
+              <a:buClr>
+                <a:schemeClr val="lt1"/>
+              </a:buClr>
+              <a:buSzPct val="72727"/>
+              <a:buFont typeface="Noto Sans Symbols"/>
+              <a:buChar char="▶"/>
+              <a:defRPr sz="1100" b="0" i="0" u="none" strike="noStrike" cap="none">
+                <a:solidFill>
+                  <a:srgbClr val="68370E"/>
+                </a:solidFill>
+                <a:latin typeface="Century Gothic"/>
+                <a:ea typeface="Century Gothic"/>
+                <a:cs typeface="Century Gothic"/>
+                <a:sym typeface="Century Gothic"/>
+              </a:defRPr>
+            </a:lvl7pPr>
+            <a:lvl8pPr marL="2578100" marR="0" lvl="7" indent="-76200" algn="l" rtl="0">
+              <a:lnSpc>
+                <a:spcPct val="100000"/>
+              </a:lnSpc>
+              <a:spcBef>
+                <a:spcPts val="200"/>
+              </a:spcBef>
+              <a:spcAft>
+                <a:spcPts val="500"/>
+              </a:spcAft>
+              <a:buClr>
+                <a:schemeClr val="lt1"/>
+              </a:buClr>
+              <a:buSzPct val="72727"/>
+              <a:buFont typeface="Noto Sans Symbols"/>
+              <a:buChar char="▶"/>
+              <a:defRPr sz="1100" b="0" i="0" u="none" strike="noStrike" cap="none">
+                <a:solidFill>
+                  <a:srgbClr val="68370E"/>
+                </a:solidFill>
+                <a:latin typeface="Century Gothic"/>
+                <a:ea typeface="Century Gothic"/>
+                <a:cs typeface="Century Gothic"/>
+                <a:sym typeface="Century Gothic"/>
+              </a:defRPr>
+            </a:lvl8pPr>
+            <a:lvl9pPr marL="2921000" marR="0" lvl="8" indent="-76200" algn="l" rtl="0">
+              <a:lnSpc>
+                <a:spcPct val="100000"/>
+              </a:lnSpc>
+              <a:spcBef>
+                <a:spcPts val="200"/>
+              </a:spcBef>
+              <a:spcAft>
+                <a:spcPts val="500"/>
+              </a:spcAft>
+              <a:buClr>
+                <a:schemeClr val="lt1"/>
+              </a:buClr>
+              <a:buSzPct val="72727"/>
+              <a:buFont typeface="Noto Sans Symbols"/>
+              <a:buChar char="▶"/>
+              <a:defRPr sz="1100" b="0" i="0" u="none" strike="noStrike" cap="none">
+                <a:solidFill>
+                  <a:srgbClr val="68370E"/>
+                </a:solidFill>
+                <a:latin typeface="Century Gothic"/>
+                <a:ea typeface="Century Gothic"/>
+                <a:cs typeface="Century Gothic"/>
+                <a:sym typeface="Century Gothic"/>
+              </a:defRPr>
+            </a:lvl9pPr>
+          </a:lstStyle>
+          <a:p>
+            <a:pPr marL="457200" indent="-342900">
+              <a:spcBef>
+                <a:spcPts val="0"/>
+              </a:spcBef>
+              <a:spcAft>
+                <a:spcPts val="0"/>
+              </a:spcAft>
+              <a:buSzPct val="75000"/>
+            </a:pPr>
+            <a:r>
+              <a:rPr lang="en-GB" sz="2000" dirty="0"/>
+              <a:t>Arena style base capture game.</a:t>
+            </a:r>
+            <a:endParaRPr lang="en" sz="2000" dirty="0"/>
+          </a:p>
+        </p:txBody>
+      </p:sp>
     </p:spTree>
   </p:cSld>
   <p:clrMapOvr>
@@ -25037,7 +25816,7 @@
               <a:buChar char="▶"/>
             </a:pPr>
             <a:r>
-              <a:rPr lang="en" sz="1600" b="0" i="0" u="none" strike="noStrike" cap="none">
+              <a:rPr lang="en" sz="1800" b="0" i="0" u="none" strike="noStrike" cap="none" dirty="0">
                 <a:solidFill>
                   <a:srgbClr val="68370E"/>
                 </a:solidFill>
@@ -25049,7 +25828,7 @@
               <a:t>Predominantly males: 16-</a:t>
             </a:r>
             <a:r>
-              <a:rPr lang="en" sz="1600"/>
+              <a:rPr lang="en" sz="1800" dirty="0"/>
               <a:t>29</a:t>
             </a:r>
           </a:p>
@@ -25059,6 +25838,26 @@
                 <a:spcPct val="100000"/>
               </a:lnSpc>
               <a:spcBef>
+                <a:spcPts val="0"/>
+              </a:spcBef>
+              <a:spcAft>
+                <a:spcPts val="0"/>
+              </a:spcAft>
+              <a:buClr>
+                <a:schemeClr val="lt1"/>
+              </a:buClr>
+              <a:buSzPct val="100000"/>
+              <a:buFont typeface="Noto Sans Symbols"/>
+              <a:buChar char="▶"/>
+            </a:pPr>
+            <a:endParaRPr lang="en" sz="1800" dirty="0"/>
+          </a:p>
+          <a:p>
+            <a:pPr marL="457200" marR="0" lvl="0" indent="-330200" algn="l" rtl="0">
+              <a:lnSpc>
+                <a:spcPct val="100000"/>
+              </a:lnSpc>
+              <a:spcBef>
                 <a:spcPts val="500"/>
               </a:spcBef>
               <a:spcAft>
@@ -25072,7 +25871,7 @@
               <a:buChar char="▶"/>
             </a:pPr>
             <a:r>
-              <a:rPr lang="en" sz="1600" b="0" i="0" u="none" strike="noStrike" cap="none">
+              <a:rPr lang="en" sz="1800" b="0" i="0" u="none" strike="noStrike" cap="none" dirty="0">
                 <a:solidFill>
                   <a:srgbClr val="68370E"/>
                 </a:solidFill>
@@ -25102,7 +25901,7 @@
               <a:buFont typeface="Noto Sans Symbols"/>
               <a:buNone/>
             </a:pPr>
-            <a:endParaRPr sz="1600" b="0" i="0" u="none" strike="noStrike" cap="none">
+            <a:endParaRPr sz="1600" b="0" i="0" u="none" strike="noStrike" cap="none" dirty="0">
               <a:solidFill>
                 <a:srgbClr val="68370F"/>
               </a:solidFill>
@@ -25130,7 +25929,7 @@
               <a:buFont typeface="Noto Sans Symbols"/>
               <a:buNone/>
             </a:pPr>
-            <a:endParaRPr sz="1500" b="0" i="0" u="none" strike="noStrike" cap="none">
+            <a:endParaRPr sz="1500" b="0" i="0" u="none" strike="noStrike" cap="none" dirty="0">
               <a:solidFill>
                 <a:srgbClr val="68370E"/>
               </a:solidFill>
@@ -25250,7 +26049,7 @@
               <a:buChar char="▶"/>
             </a:pPr>
             <a:r>
-              <a:rPr lang="en" sz="2400" b="0" i="0" u="none" strike="noStrike" cap="none">
+              <a:rPr lang="en" sz="1800" b="0" i="0" u="none" strike="noStrike" cap="none" dirty="0">
                 <a:solidFill>
                   <a:srgbClr val="68370E"/>
                 </a:solidFill>
@@ -26780,7 +27579,7 @@
               <a:buFont typeface="Noto Sans Symbols"/>
               <a:buNone/>
             </a:pPr>
-            <a:endParaRPr sz="2400" b="0" i="0" u="none" strike="noStrike" cap="none">
+            <a:endParaRPr sz="2400" b="0" i="0" u="none" strike="noStrike" cap="none" dirty="0">
               <a:solidFill>
                 <a:srgbClr val="68370E"/>
               </a:solidFill>
@@ -26809,7 +27608,7 @@
               <a:buChar char="▶"/>
             </a:pPr>
             <a:r>
-              <a:rPr lang="en" sz="2400" b="0" i="0" u="none" strike="noStrike" cap="none">
+              <a:rPr lang="en" sz="2400" b="0" i="0" u="none" strike="noStrike" cap="none" dirty="0">
                 <a:solidFill>
                   <a:srgbClr val="68370E"/>
                 </a:solidFill>
@@ -26839,7 +27638,7 @@
               <a:buFont typeface="Noto Sans Symbols"/>
               <a:buNone/>
             </a:pPr>
-            <a:endParaRPr sz="2400" b="0" i="0" u="none" strike="noStrike" cap="none">
+            <a:endParaRPr sz="2400" b="0" i="0" u="none" strike="noStrike" cap="none" dirty="0">
               <a:solidFill>
                 <a:srgbClr val="68370E"/>
               </a:solidFill>
@@ -26868,7 +27667,7 @@
               <a:buChar char="▶"/>
             </a:pPr>
             <a:r>
-              <a:rPr lang="en" sz="2400" b="0" i="0" u="none" strike="noStrike" cap="none">
+              <a:rPr lang="en" sz="2400" b="0" i="0" u="none" strike="noStrike" cap="none" dirty="0">
                 <a:solidFill>
                   <a:srgbClr val="68370E"/>
                 </a:solidFill>

</xml_diff>